<commit_message>
I added one diagram to M4 and Slids
</commit_message>
<xml_diff>
--- a/M4/BORGPresentation.pptx
+++ b/M4/BORGPresentation.pptx
@@ -5,7 +5,7 @@
     <p:sldMasterId id="2147483654" r:id="rId1"/>
   </p:sldMasterIdLst>
   <p:notesMasterIdLst>
-    <p:notesMasterId r:id="rId21"/>
+    <p:notesMasterId r:id="rId22"/>
   </p:notesMasterIdLst>
   <p:sldIdLst>
     <p:sldId id="256" r:id="rId2"/>
@@ -21,12 +21,13 @@
     <p:sldId id="268" r:id="rId12"/>
     <p:sldId id="272" r:id="rId13"/>
     <p:sldId id="273" r:id="rId14"/>
-    <p:sldId id="274" r:id="rId15"/>
-    <p:sldId id="275" r:id="rId16"/>
-    <p:sldId id="276" r:id="rId17"/>
-    <p:sldId id="277" r:id="rId18"/>
-    <p:sldId id="278" r:id="rId19"/>
-    <p:sldId id="267" r:id="rId20"/>
+    <p:sldId id="279" r:id="rId15"/>
+    <p:sldId id="274" r:id="rId16"/>
+    <p:sldId id="275" r:id="rId17"/>
+    <p:sldId id="276" r:id="rId18"/>
+    <p:sldId id="277" r:id="rId19"/>
+    <p:sldId id="278" r:id="rId20"/>
+    <p:sldId id="267" r:id="rId21"/>
   </p:sldIdLst>
   <p:sldSz cx="9144000" cy="6858000" type="screen4x3"/>
   <p:notesSz cx="6858000" cy="9144000"/>
@@ -3719,7 +3720,6 @@
               <a:rPr lang="en-CA" sz="3200" dirty="0" smtClean="0"/>
               <a:t>MVC Pattern </a:t>
             </a:r>
-            <a:endParaRPr lang="en-CA" sz="3200" dirty="0" smtClean="0"/>
           </a:p>
           <a:p>
             <a:r>
@@ -3730,11 +3730,7 @@
           <a:p>
             <a:r>
               <a:rPr lang="en-CA" dirty="0" smtClean="0"/>
-              <a:t>Factory </a:t>
-            </a:r>
-            <a:r>
-              <a:rPr lang="en-CA" dirty="0" smtClean="0"/>
-              <a:t>Pattern</a:t>
+              <a:t>Factory Pattern</a:t>
             </a:r>
           </a:p>
           <a:p>
@@ -4020,11 +4016,7 @@
           <a:p>
             <a:r>
               <a:rPr lang="en-CA" dirty="0" smtClean="0"/>
-              <a:t>Observer </a:t>
-            </a:r>
-            <a:r>
-              <a:rPr lang="en-CA" dirty="0" smtClean="0"/>
-              <a:t>(listener) pattern </a:t>
+              <a:t>Observer (listener) pattern </a:t>
             </a:r>
           </a:p>
           <a:p>
@@ -4061,12 +4053,14 @@
       </p:sp>
       <p:pic>
         <p:nvPicPr>
-          <p:cNvPr id="6" name="Picture 5" descr="C:\Users\man\Desktop\BorgclassDiagram.gif"/>
-          <p:cNvPicPr/>
+          <p:cNvPr id="1027" name="Picture 3" descr="C:\Users\man\Desktop\observerClassDiagram.png"/>
+          <p:cNvPicPr>
+            <a:picLocks noChangeAspect="1" noChangeArrowheads="1"/>
+          </p:cNvPicPr>
           <p:nvPr/>
         </p:nvPicPr>
         <p:blipFill>
-          <a:blip r:embed="rId2" cstate="print"/>
+          <a:blip r:embed="rId2"/>
           <a:srcRect/>
           <a:stretch>
             <a:fillRect/>
@@ -4074,19 +4068,13 @@
         </p:blipFill>
         <p:spPr bwMode="auto">
           <a:xfrm>
-            <a:off x="285720" y="571481"/>
-            <a:ext cx="8715436" cy="5214974"/>
+            <a:off x="0" y="285728"/>
+            <a:ext cx="9144000" cy="4824435"/>
           </a:xfrm>
           <a:prstGeom prst="rect">
             <a:avLst/>
           </a:prstGeom>
           <a:noFill/>
-          <a:ln w="9525">
-            <a:noFill/>
-            <a:miter lim="800000"/>
-            <a:headEnd/>
-            <a:tailEnd/>
-          </a:ln>
         </p:spPr>
       </p:pic>
     </p:spTree>
@@ -4134,11 +4122,7 @@
           <a:p>
             <a:r>
               <a:rPr lang="en-CA" dirty="0" smtClean="0"/>
-              <a:t>Observer </a:t>
-            </a:r>
-            <a:r>
-              <a:rPr lang="en-CA" dirty="0" smtClean="0"/>
-              <a:t>(listener) pattern </a:t>
+              <a:t>Observer (listener) pattern </a:t>
             </a:r>
           </a:p>
           <a:p>
@@ -4175,7 +4159,7 @@
       </p:sp>
       <p:pic>
         <p:nvPicPr>
-          <p:cNvPr id="5" name="Picture 4" descr="C:\Users\man\Desktop\ObserverSequenceDiagram.png"/>
+          <p:cNvPr id="6" name="Picture 5" descr="C:\Users\man\Desktop\BorgclassDiagram.gif"/>
           <p:cNvPicPr/>
           <p:nvPr/>
         </p:nvPicPr>
@@ -4188,8 +4172,8 @@
         </p:blipFill>
         <p:spPr bwMode="auto">
           <a:xfrm>
-            <a:off x="214282" y="0"/>
-            <a:ext cx="8715436" cy="5643578"/>
+            <a:off x="285720" y="571481"/>
+            <a:ext cx="8715436" cy="5214974"/>
           </a:xfrm>
           <a:prstGeom prst="rect">
             <a:avLst/>
@@ -4246,20 +4230,10 @@
             <a:endParaRPr lang="en-CA" dirty="0" smtClean="0"/>
           </a:p>
           <a:p>
-            <a:endParaRPr lang="en-CA" dirty="0" smtClean="0"/>
-          </a:p>
-          <a:p>
             <a:r>
               <a:rPr lang="en-CA" dirty="0" smtClean="0"/>
-              <a:t>Factory </a:t>
-            </a:r>
-            <a:r>
-              <a:rPr lang="en-CA" dirty="0" smtClean="0"/>
-              <a:t>Pattern</a:t>
-            </a:r>
-          </a:p>
-          <a:p>
-            <a:endParaRPr lang="en-CA" dirty="0" smtClean="0"/>
+              <a:t>Observer (listener) pattern </a:t>
+            </a:r>
           </a:p>
           <a:p>
             <a:endParaRPr lang="en-CA" dirty="0" smtClean="0"/>
@@ -4295,24 +4269,32 @@
       </p:sp>
       <p:pic>
         <p:nvPicPr>
-          <p:cNvPr id="6" name="image00.png"/>
+          <p:cNvPr id="5" name="Picture 4" descr="C:\Users\man\Desktop\ObserverSequenceDiagram.png"/>
           <p:cNvPicPr/>
           <p:nvPr/>
         </p:nvPicPr>
         <p:blipFill>
           <a:blip r:embed="rId2" cstate="print"/>
+          <a:srcRect/>
           <a:stretch>
             <a:fillRect/>
           </a:stretch>
         </p:blipFill>
-        <p:spPr>
+        <p:spPr bwMode="auto">
           <a:xfrm>
-            <a:off x="214282" y="285728"/>
-            <a:ext cx="8643998" cy="5500726"/>
+            <a:off x="214282" y="0"/>
+            <a:ext cx="8715436" cy="5643578"/>
           </a:xfrm>
           <a:prstGeom prst="rect">
             <a:avLst/>
           </a:prstGeom>
+          <a:noFill/>
+          <a:ln w="9525">
+            <a:noFill/>
+            <a:miter lim="800000"/>
+            <a:headEnd/>
+            <a:tailEnd/>
+          </a:ln>
         </p:spPr>
       </p:pic>
     </p:spTree>
@@ -4361,20 +4343,10 @@
             <a:endParaRPr lang="en-CA" dirty="0" smtClean="0"/>
           </a:p>
           <a:p>
-            <a:endParaRPr lang="en-CA" dirty="0" smtClean="0"/>
-          </a:p>
-          <a:p>
             <a:r>
               <a:rPr lang="en-CA" dirty="0" smtClean="0"/>
-              <a:t>Composite </a:t>
-            </a:r>
-            <a:r>
-              <a:rPr lang="en-CA" dirty="0" smtClean="0"/>
-              <a:t>Pattern</a:t>
-            </a:r>
-          </a:p>
-          <a:p>
-            <a:endParaRPr lang="en-CA" dirty="0" smtClean="0"/>
+              <a:t>Factory Pattern</a:t>
+            </a:r>
           </a:p>
           <a:p>
             <a:endParaRPr lang="en-CA" dirty="0" smtClean="0"/>
@@ -4413,26 +4385,20 @@
       </p:sp>
       <p:pic>
         <p:nvPicPr>
-          <p:cNvPr id="5" name="Picture 4"/>
+          <p:cNvPr id="6" name="image00.png"/>
           <p:cNvPicPr/>
           <p:nvPr/>
         </p:nvPicPr>
         <p:blipFill>
-          <a:blip r:embed="rId2">
-            <a:extLst>
-              <a:ext uri="{28A0092B-C50C-407E-A947-70E740481C1C}">
-                <a14:useLocalDpi xmlns="" xmlns:wpc="http://schemas.microsoft.com/office/word/2010/wordprocessingCanvas" xmlns:mc="http://schemas.openxmlformats.org/markup-compatibility/2006" xmlns:o="urn:schemas-microsoft-com:office:office" xmlns:m="http://schemas.openxmlformats.org/officeDocument/2006/math" xmlns:v="urn:schemas-microsoft-com:vml" xmlns:wp14="http://schemas.microsoft.com/office/word/2010/wordprocessingDrawing" xmlns:wp="http://schemas.openxmlformats.org/drawingml/2006/wordprocessingDrawing" xmlns:w10="urn:schemas-microsoft-com:office:word" xmlns:w="http://schemas.openxmlformats.org/wordprocessingml/2006/main" xmlns:w14="http://schemas.microsoft.com/office/word/2010/wordml" xmlns:w15="http://schemas.microsoft.com/office/word/2012/wordml" xmlns:wpg="http://schemas.microsoft.com/office/word/2010/wordprocessingGroup" xmlns:wpi="http://schemas.microsoft.com/office/word/2010/wordprocessingInk" xmlns:wne="http://schemas.microsoft.com/office/word/2006/wordml" xmlns:wps="http://schemas.microsoft.com/office/word/2010/wordprocessingShape" xmlns:a14="http://schemas.microsoft.com/office/drawing/2010/main" xmlns:pic="http://schemas.openxmlformats.org/drawingml/2006/picture" xmlns:lc="http://schemas.openxmlformats.org/drawingml/2006/lockedCanvas" val="0"/>
-              </a:ext>
-            </a:extLst>
-          </a:blip>
+          <a:blip r:embed="rId2" cstate="print"/>
           <a:stretch>
             <a:fillRect/>
           </a:stretch>
         </p:blipFill>
         <p:spPr>
           <a:xfrm>
-            <a:off x="285720" y="428604"/>
-            <a:ext cx="8643997" cy="4925339"/>
+            <a:off x="214282" y="285728"/>
+            <a:ext cx="8643998" cy="5500726"/>
           </a:xfrm>
           <a:prstGeom prst="rect">
             <a:avLst/>
@@ -4466,6 +4432,126 @@
       </p:grpSpPr>
       <p:sp>
         <p:nvSpPr>
+          <p:cNvPr id="4" name="Text Placeholder 3"/>
+          <p:cNvSpPr>
+            <a:spLocks noGrp="1"/>
+          </p:cNvSpPr>
+          <p:nvPr>
+            <p:ph type="body" idx="1"/>
+          </p:nvPr>
+        </p:nvSpPr>
+        <p:spPr/>
+        <p:txBody>
+          <a:bodyPr/>
+          <a:lstStyle/>
+          <a:p>
+            <a:endParaRPr lang="en-CA" dirty="0" smtClean="0"/>
+          </a:p>
+          <a:p>
+            <a:endParaRPr lang="en-CA" dirty="0" smtClean="0"/>
+          </a:p>
+          <a:p>
+            <a:endParaRPr lang="en-CA" dirty="0" smtClean="0"/>
+          </a:p>
+          <a:p>
+            <a:r>
+              <a:rPr lang="en-CA" dirty="0" smtClean="0"/>
+              <a:t>Composite Pattern</a:t>
+            </a:r>
+          </a:p>
+          <a:p>
+            <a:endParaRPr lang="en-CA" dirty="0" smtClean="0"/>
+          </a:p>
+          <a:p>
+            <a:endParaRPr lang="en-CA" dirty="0" smtClean="0"/>
+          </a:p>
+          <a:p>
+            <a:endParaRPr lang="en-CA" dirty="0" smtClean="0"/>
+          </a:p>
+        </p:txBody>
+      </p:sp>
+      <p:sp>
+        <p:nvSpPr>
+          <p:cNvPr id="2" name="Title 1"/>
+          <p:cNvSpPr>
+            <a:spLocks noGrp="1"/>
+          </p:cNvSpPr>
+          <p:nvPr>
+            <p:ph type="title" idx="4294967295"/>
+          </p:nvPr>
+        </p:nvSpPr>
+        <p:spPr>
+          <a:xfrm>
+            <a:off x="0" y="274638"/>
+            <a:ext cx="8229600" cy="1522412"/>
+          </a:xfrm>
+        </p:spPr>
+        <p:txBody>
+          <a:bodyPr/>
+          <a:lstStyle/>
+          <a:p>
+            <a:r>
+              <a:rPr lang="en-CA" dirty="0" smtClean="0"/>
+              <a:t>MVC Pattern </a:t>
+            </a:r>
+          </a:p>
+        </p:txBody>
+      </p:sp>
+      <p:pic>
+        <p:nvPicPr>
+          <p:cNvPr id="5" name="Picture 4"/>
+          <p:cNvPicPr/>
+          <p:nvPr/>
+        </p:nvPicPr>
+        <p:blipFill>
+          <a:blip r:embed="rId2">
+            <a:extLst>
+              <a:ext uri="{28A0092B-C50C-407E-A947-70E740481C1C}">
+                <a14:useLocalDpi xmlns:lc="http://schemas.openxmlformats.org/drawingml/2006/lockedCanvas" xmlns:pic="http://schemas.openxmlformats.org/drawingml/2006/picture" xmlns:a14="http://schemas.microsoft.com/office/drawing/2010/main" xmlns:wps="http://schemas.microsoft.com/office/word/2010/wordprocessingShape" xmlns:wne="http://schemas.microsoft.com/office/word/2006/wordml" xmlns:wpi="http://schemas.microsoft.com/office/word/2010/wordprocessingInk" xmlns:wpg="http://schemas.microsoft.com/office/word/2010/wordprocessingGroup" xmlns:w15="http://schemas.microsoft.com/office/word/2012/wordml" xmlns:w14="http://schemas.microsoft.com/office/word/2010/wordml" xmlns:w="http://schemas.openxmlformats.org/wordprocessingml/2006/main" xmlns:w10="urn:schemas-microsoft-com:office:word" xmlns:wp="http://schemas.openxmlformats.org/drawingml/2006/wordprocessingDrawing" xmlns:wp14="http://schemas.microsoft.com/office/word/2010/wordprocessingDrawing" xmlns:v="urn:schemas-microsoft-com:vml" xmlns:m="http://schemas.openxmlformats.org/officeDocument/2006/math" xmlns:o="urn:schemas-microsoft-com:office:office" xmlns:mc="http://schemas.openxmlformats.org/markup-compatibility/2006" xmlns:wpc="http://schemas.microsoft.com/office/word/2010/wordprocessingCanvas" xmlns="" val="0"/>
+              </a:ext>
+            </a:extLst>
+          </a:blip>
+          <a:stretch>
+            <a:fillRect/>
+          </a:stretch>
+        </p:blipFill>
+        <p:spPr>
+          <a:xfrm>
+            <a:off x="285720" y="428604"/>
+            <a:ext cx="8643997" cy="4925339"/>
+          </a:xfrm>
+          <a:prstGeom prst="rect">
+            <a:avLst/>
+          </a:prstGeom>
+        </p:spPr>
+      </p:pic>
+    </p:spTree>
+  </p:cSld>
+  <p:clrMapOvr>
+    <a:masterClrMapping/>
+  </p:clrMapOvr>
+</p:sld>
+</file>
+
+<file path=ppt/slides/slide18.xml><?xml version="1.0" encoding="utf-8"?>
+<p:sld xmlns:a="http://schemas.openxmlformats.org/drawingml/2006/main" xmlns:r="http://schemas.openxmlformats.org/officeDocument/2006/relationships" xmlns:p="http://schemas.openxmlformats.org/presentationml/2006/main">
+  <p:cSld>
+    <p:spTree>
+      <p:nvGrpSpPr>
+        <p:cNvPr id="1" name=""/>
+        <p:cNvGrpSpPr/>
+        <p:nvPr/>
+      </p:nvGrpSpPr>
+      <p:grpSpPr>
+        <a:xfrm>
+          <a:off x="0" y="0"/>
+          <a:ext cx="0" cy="0"/>
+          <a:chOff x="0" y="0"/>
+          <a:chExt cx="0" cy="0"/>
+        </a:xfrm>
+      </p:grpSpPr>
+      <p:sp>
+        <p:nvSpPr>
           <p:cNvPr id="3" name="Title 2"/>
           <p:cNvSpPr>
             <a:spLocks noGrp="1"/>
@@ -4512,11 +4598,7 @@
           <a:p>
             <a:r>
               <a:rPr lang="en-CA" sz="2800" dirty="0" smtClean="0"/>
-              <a:t>Step </a:t>
-            </a:r>
-            <a:r>
-              <a:rPr lang="en-CA" sz="2800" dirty="0" smtClean="0"/>
-              <a:t>1: Copy </a:t>
+              <a:t>Step 1: Copy </a:t>
             </a:r>
             <a:r>
               <a:rPr lang="en-CA" sz="2800" dirty="0" err="1" smtClean="0"/>
@@ -4543,11 +4625,7 @@
           <a:p>
             <a:r>
               <a:rPr lang="en-CA" sz="2800" dirty="0" smtClean="0"/>
-              <a:t>Step </a:t>
-            </a:r>
-            <a:r>
-              <a:rPr lang="en-CA" sz="2800" dirty="0" smtClean="0"/>
-              <a:t>2: Replace usages of </a:t>
+              <a:t>Step 2: Replace usages of </a:t>
             </a:r>
             <a:r>
               <a:rPr lang="en-CA" sz="2800" dirty="0" err="1" smtClean="0"/>
@@ -4569,11 +4647,7 @@
           <a:p>
             <a:r>
               <a:rPr lang="en-CA" sz="2800" dirty="0" smtClean="0"/>
-              <a:t>Step </a:t>
-            </a:r>
-            <a:r>
-              <a:rPr lang="en-CA" sz="2800" dirty="0" smtClean="0"/>
-              <a:t>3: Remove </a:t>
+              <a:t>Step 3: Remove </a:t>
             </a:r>
             <a:r>
               <a:rPr lang="en-CA" sz="2800" dirty="0" err="1" smtClean="0"/>
@@ -4587,11 +4661,7 @@
           <a:p>
             <a:r>
               <a:rPr lang="en-CA" sz="2800" dirty="0" smtClean="0"/>
-              <a:t> </a:t>
-            </a:r>
-            <a:r>
-              <a:rPr lang="en-CA" sz="2800" dirty="0" smtClean="0"/>
-              <a:t>Step 4: Replace usages of </a:t>
+              <a:t> Step 4: Replace usages of </a:t>
             </a:r>
             <a:r>
               <a:rPr lang="en-CA" sz="2800" dirty="0" err="1" smtClean="0"/>
@@ -4613,11 +4683,7 @@
           <a:p>
             <a:r>
               <a:rPr lang="en-CA" dirty="0" smtClean="0"/>
-              <a:t>Step </a:t>
-            </a:r>
-            <a:r>
-              <a:rPr lang="en-CA" dirty="0" smtClean="0"/>
-              <a:t>5: Remove </a:t>
+              <a:t>Step 5: Remove </a:t>
             </a:r>
             <a:r>
               <a:rPr lang="en-CA" dirty="0" err="1" smtClean="0"/>
@@ -4641,7 +4707,7 @@
 </p:sld>
 </file>
 
-<file path=ppt/slides/slide18.xml><?xml version="1.0" encoding="utf-8"?>
+<file path=ppt/slides/slide19.xml><?xml version="1.0" encoding="utf-8"?>
 <p:sld xmlns:a="http://schemas.openxmlformats.org/drawingml/2006/main" xmlns:r="http://schemas.openxmlformats.org/officeDocument/2006/relationships" xmlns:p="http://schemas.openxmlformats.org/presentationml/2006/main">
   <p:cSld>
     <p:spTree>
@@ -4961,11 +5027,7 @@
           <a:p>
             <a:r>
               <a:rPr lang="en-CA" sz="1600" dirty="0" smtClean="0"/>
-              <a:t>+    </a:t>
-            </a:r>
-            <a:r>
-              <a:rPr lang="en-CA" sz="1600" dirty="0" smtClean="0"/>
-              <a:t>/**</a:t>
+              <a:t>+    /**</a:t>
             </a:r>
           </a:p>
           <a:p>
@@ -4974,131 +5036,6 @@
               <a:t>...</a:t>
             </a:r>
             <a:endParaRPr lang="en-CA" sz="1600" dirty="0"/>
-          </a:p>
-        </p:txBody>
-      </p:sp>
-    </p:spTree>
-  </p:cSld>
-  <p:clrMapOvr>
-    <a:masterClrMapping/>
-  </p:clrMapOvr>
-</p:sld>
-</file>
-
-<file path=ppt/slides/slide19.xml><?xml version="1.0" encoding="utf-8"?>
-<p:sld xmlns:a="http://schemas.openxmlformats.org/drawingml/2006/main" xmlns:r="http://schemas.openxmlformats.org/officeDocument/2006/relationships" xmlns:p="http://schemas.openxmlformats.org/presentationml/2006/main">
-  <p:cSld>
-    <p:spTree>
-      <p:nvGrpSpPr>
-        <p:cNvPr id="1" name=""/>
-        <p:cNvGrpSpPr/>
-        <p:nvPr/>
-      </p:nvGrpSpPr>
-      <p:grpSpPr>
-        <a:xfrm>
-          <a:off x="0" y="0"/>
-          <a:ext cx="0" cy="0"/>
-          <a:chOff x="0" y="0"/>
-          <a:chExt cx="0" cy="0"/>
-        </a:xfrm>
-      </p:grpSpPr>
-      <p:sp>
-        <p:nvSpPr>
-          <p:cNvPr id="2" name="Title 1"/>
-          <p:cNvSpPr>
-            <a:spLocks noGrp="1"/>
-          </p:cNvSpPr>
-          <p:nvPr>
-            <p:ph type="title"/>
-          </p:nvPr>
-        </p:nvSpPr>
-        <p:spPr/>
-        <p:txBody>
-          <a:bodyPr/>
-          <a:lstStyle/>
-          <a:p>
-            <a:pPr algn="ctr"/>
-            <a:r>
-              <a:rPr lang="en-CA" dirty="0" smtClean="0"/>
-              <a:t>Conclusion </a:t>
-            </a:r>
-            <a:endParaRPr lang="en-CA" dirty="0"/>
-          </a:p>
-        </p:txBody>
-      </p:sp>
-      <p:sp>
-        <p:nvSpPr>
-          <p:cNvPr id="3" name="Text Placeholder 2"/>
-          <p:cNvSpPr>
-            <a:spLocks noGrp="1"/>
-          </p:cNvSpPr>
-          <p:nvPr>
-            <p:ph type="body" idx="1"/>
-          </p:nvPr>
-        </p:nvSpPr>
-        <p:spPr/>
-        <p:txBody>
-          <a:bodyPr/>
-          <a:lstStyle/>
-          <a:p>
-            <a:r>
-              <a:rPr lang="en-CA" dirty="0" smtClean="0"/>
-              <a:t>What we learned </a:t>
-            </a:r>
-          </a:p>
-          <a:p>
-            <a:r>
-              <a:rPr lang="en-CA" dirty="0" smtClean="0"/>
-              <a:t>Using  </a:t>
-            </a:r>
-            <a:r>
-              <a:rPr lang="en-CA" dirty="0" err="1" smtClean="0"/>
-              <a:t>Git</a:t>
-            </a:r>
-            <a:r>
-              <a:rPr lang="en-CA" dirty="0" smtClean="0"/>
-              <a:t> and </a:t>
-            </a:r>
-            <a:r>
-              <a:rPr lang="en-CA" dirty="0" err="1" smtClean="0"/>
-              <a:t>GitHub</a:t>
-            </a:r>
-            <a:endParaRPr lang="en-CA" dirty="0" smtClean="0"/>
-          </a:p>
-          <a:p>
-            <a:r>
-              <a:rPr lang="en-CA" dirty="0" smtClean="0"/>
-              <a:t>Collaborating in an open source project</a:t>
-            </a:r>
-          </a:p>
-          <a:p>
-            <a:r>
-              <a:rPr lang="en-CA" dirty="0" smtClean="0"/>
-              <a:t>Reverse engineering and detection of project Architecture </a:t>
-            </a:r>
-          </a:p>
-          <a:p>
-            <a:r>
-              <a:rPr lang="en-CA" dirty="0" smtClean="0"/>
-              <a:t>Reverse engineering tools like Object Aid UML</a:t>
-            </a:r>
-          </a:p>
-          <a:p>
-            <a:r>
-              <a:rPr lang="en-CA" dirty="0" smtClean="0"/>
-              <a:t>Collaborate </a:t>
-            </a:r>
-            <a:r>
-              <a:rPr lang="en-CA" smtClean="0"/>
-              <a:t>in teamwork </a:t>
-            </a:r>
-            <a:endParaRPr lang="en-CA" dirty="0" smtClean="0"/>
-          </a:p>
-          <a:p>
-            <a:endParaRPr lang="en-CA" dirty="0" smtClean="0"/>
-          </a:p>
-          <a:p>
-            <a:endParaRPr lang="en-CA" dirty="0"/>
           </a:p>
         </p:txBody>
       </p:sp>
@@ -5290,6 +5227,131 @@
       </p:par>
     </p:tnLst>
   </p:timing>
+</p:sld>
+</file>
+
+<file path=ppt/slides/slide20.xml><?xml version="1.0" encoding="utf-8"?>
+<p:sld xmlns:a="http://schemas.openxmlformats.org/drawingml/2006/main" xmlns:r="http://schemas.openxmlformats.org/officeDocument/2006/relationships" xmlns:p="http://schemas.openxmlformats.org/presentationml/2006/main">
+  <p:cSld>
+    <p:spTree>
+      <p:nvGrpSpPr>
+        <p:cNvPr id="1" name=""/>
+        <p:cNvGrpSpPr/>
+        <p:nvPr/>
+      </p:nvGrpSpPr>
+      <p:grpSpPr>
+        <a:xfrm>
+          <a:off x="0" y="0"/>
+          <a:ext cx="0" cy="0"/>
+          <a:chOff x="0" y="0"/>
+          <a:chExt cx="0" cy="0"/>
+        </a:xfrm>
+      </p:grpSpPr>
+      <p:sp>
+        <p:nvSpPr>
+          <p:cNvPr id="2" name="Title 1"/>
+          <p:cNvSpPr>
+            <a:spLocks noGrp="1"/>
+          </p:cNvSpPr>
+          <p:nvPr>
+            <p:ph type="title"/>
+          </p:nvPr>
+        </p:nvSpPr>
+        <p:spPr/>
+        <p:txBody>
+          <a:bodyPr/>
+          <a:lstStyle/>
+          <a:p>
+            <a:pPr algn="ctr"/>
+            <a:r>
+              <a:rPr lang="en-CA" dirty="0" smtClean="0"/>
+              <a:t>Conclusion </a:t>
+            </a:r>
+            <a:endParaRPr lang="en-CA" dirty="0"/>
+          </a:p>
+        </p:txBody>
+      </p:sp>
+      <p:sp>
+        <p:nvSpPr>
+          <p:cNvPr id="3" name="Text Placeholder 2"/>
+          <p:cNvSpPr>
+            <a:spLocks noGrp="1"/>
+          </p:cNvSpPr>
+          <p:nvPr>
+            <p:ph type="body" idx="1"/>
+          </p:nvPr>
+        </p:nvSpPr>
+        <p:spPr/>
+        <p:txBody>
+          <a:bodyPr/>
+          <a:lstStyle/>
+          <a:p>
+            <a:r>
+              <a:rPr lang="en-CA" dirty="0" smtClean="0"/>
+              <a:t>What we learned </a:t>
+            </a:r>
+          </a:p>
+          <a:p>
+            <a:r>
+              <a:rPr lang="en-CA" dirty="0" smtClean="0"/>
+              <a:t>Using  </a:t>
+            </a:r>
+            <a:r>
+              <a:rPr lang="en-CA" dirty="0" err="1" smtClean="0"/>
+              <a:t>Git</a:t>
+            </a:r>
+            <a:r>
+              <a:rPr lang="en-CA" dirty="0" smtClean="0"/>
+              <a:t> and </a:t>
+            </a:r>
+            <a:r>
+              <a:rPr lang="en-CA" dirty="0" err="1" smtClean="0"/>
+              <a:t>GitHub</a:t>
+            </a:r>
+            <a:endParaRPr lang="en-CA" dirty="0" smtClean="0"/>
+          </a:p>
+          <a:p>
+            <a:r>
+              <a:rPr lang="en-CA" dirty="0" smtClean="0"/>
+              <a:t>Collaborating in an open source project</a:t>
+            </a:r>
+          </a:p>
+          <a:p>
+            <a:r>
+              <a:rPr lang="en-CA" dirty="0" smtClean="0"/>
+              <a:t>Reverse engineering and detection of project Architecture </a:t>
+            </a:r>
+          </a:p>
+          <a:p>
+            <a:r>
+              <a:rPr lang="en-CA" dirty="0" smtClean="0"/>
+              <a:t>Reverse engineering tools like Object Aid UML</a:t>
+            </a:r>
+          </a:p>
+          <a:p>
+            <a:r>
+              <a:rPr lang="en-CA" dirty="0" smtClean="0"/>
+              <a:t>Collaborate </a:t>
+            </a:r>
+            <a:r>
+              <a:rPr lang="en-CA" smtClean="0"/>
+              <a:t>in teamwork </a:t>
+            </a:r>
+            <a:endParaRPr lang="en-CA" dirty="0" smtClean="0"/>
+          </a:p>
+          <a:p>
+            <a:endParaRPr lang="en-CA" dirty="0" smtClean="0"/>
+          </a:p>
+          <a:p>
+            <a:endParaRPr lang="en-CA" dirty="0"/>
+          </a:p>
+        </p:txBody>
+      </p:sp>
+    </p:spTree>
+  </p:cSld>
+  <p:clrMapOvr>
+    <a:masterClrMapping/>
+  </p:clrMapOvr>
 </p:sld>
 </file>
 

</xml_diff>